<commit_message>
:) :) :) :) :) :) :)
</commit_message>
<xml_diff>
--- a/Apresentação.pptx
+++ b/Apresentação.pptx
@@ -125,6 +125,11 @@
       </a:defRPr>
     </a:lvl9pPr>
   </p:defaultTextStyle>
+  <p:extLst>
+    <p:ext uri="{EFAFB233-063F-42B5-8137-9DF3F51BA10A}">
+      <p15:sldGuideLst xmlns:p15="http://schemas.microsoft.com/office/powerpoint/2012/main"/>
+    </p:ext>
+  </p:extLst>
 </p:presentation>
 </file>
 
@@ -17234,26 +17239,36 @@
               <a:buNone/>
             </a:pPr>
             <a:r>
-              <a:rPr lang="pt-PT" sz="3200" b="0" strike="noStrike" spc="-1">
+              <a:rPr lang="pt-PT" sz="3200" b="0" strike="noStrike" spc="-1" dirty="0">
                 <a:solidFill>
                   <a:srgbClr val="000000"/>
                 </a:solidFill>
                 <a:latin typeface="Arial"/>
                 <a:ea typeface="DejaVu Sans"/>
               </a:rPr>
-              <a:t>Leitura do dataset</a:t>
-            </a:r>
-            <a:r>
-              <a:rPr lang="pt-PT" sz="4400" b="0" strike="noStrike" spc="-1">
+              <a:t>Leitura do </a:t>
+            </a:r>
+            <a:r>
+              <a:rPr lang="pt-PT" sz="3200" b="0" strike="noStrike" spc="-1" dirty="0" err="1">
                 <a:solidFill>
                   <a:srgbClr val="000000"/>
                 </a:solidFill>
                 <a:latin typeface="Arial"/>
                 <a:ea typeface="DejaVu Sans"/>
               </a:rPr>
+              <a:t>dataset</a:t>
+            </a:r>
+            <a:r>
+              <a:rPr lang="pt-PT" sz="4400" b="0" strike="noStrike" spc="-1" dirty="0">
+                <a:solidFill>
+                  <a:srgbClr val="000000"/>
+                </a:solidFill>
+                <a:latin typeface="Arial"/>
+                <a:ea typeface="DejaVu Sans"/>
+              </a:rPr>
               <a:t> </a:t>
             </a:r>
-            <a:endParaRPr lang="en-US" sz="4400" b="0" strike="noStrike" spc="-1">
+            <a:endParaRPr lang="en-US" sz="4400" b="0" strike="noStrike" spc="-1" dirty="0">
               <a:latin typeface="Arial"/>
             </a:endParaRPr>
           </a:p>
@@ -17299,7 +17314,7 @@
         </p:nvSpPr>
         <p:spPr>
           <a:xfrm>
-            <a:off x="504000" y="991990"/>
+            <a:off x="504000" y="1058230"/>
             <a:ext cx="9069120" cy="4678560"/>
           </a:xfrm>
           <a:prstGeom prst="rect">
@@ -17324,9 +17339,95 @@
         </p:style>
         <p:txBody>
           <a:bodyPr lIns="0" tIns="0" rIns="0" bIns="0" anchor="t">
-            <a:normAutofit fontScale="99500"/>
-          </a:bodyPr>
-          <a:lstStyle/>
+            <a:normAutofit fontScale="92000"/>
+          </a:bodyPr>
+          <a:lstStyle/>
+          <a:p>
+            <a:pPr marL="432000" indent="-321840">
+              <a:lnSpc>
+                <a:spcPct val="100000"/>
+              </a:lnSpc>
+              <a:spcBef>
+                <a:spcPts val="1417"/>
+              </a:spcBef>
+              <a:buClr>
+                <a:srgbClr val="000000"/>
+              </a:buClr>
+              <a:buSzPct val="45000"/>
+              <a:buFont typeface="Wingdings" charset="2"/>
+              <a:buChar char=""/>
+            </a:pPr>
+            <a:r>
+              <a:rPr lang="pt-PT" sz="2200" b="0" strike="noStrike" spc="-1" dirty="0">
+                <a:solidFill>
+                  <a:srgbClr val="000000"/>
+                </a:solidFill>
+                <a:latin typeface="Arial"/>
+                <a:ea typeface="DejaVu Sans"/>
+              </a:rPr>
+              <a:t>Os ficheiros .</a:t>
+            </a:r>
+            <a:r>
+              <a:rPr lang="pt-PT" sz="2200" b="0" strike="noStrike" spc="-1" dirty="0" err="1">
+                <a:solidFill>
+                  <a:srgbClr val="000000"/>
+                </a:solidFill>
+                <a:latin typeface="Arial"/>
+                <a:ea typeface="DejaVu Sans"/>
+              </a:rPr>
+              <a:t>csv</a:t>
+            </a:r>
+            <a:r>
+              <a:rPr lang="pt-PT" sz="2200" b="0" strike="noStrike" spc="-1" dirty="0">
+                <a:solidFill>
+                  <a:srgbClr val="000000"/>
+                </a:solidFill>
+                <a:latin typeface="Arial"/>
+                <a:ea typeface="DejaVu Sans"/>
+              </a:rPr>
+              <a:t> que compõem o </a:t>
+            </a:r>
+            <a:r>
+              <a:rPr lang="pt-PT" sz="2200" b="0" strike="noStrike" spc="-1" dirty="0" err="1">
+                <a:solidFill>
+                  <a:srgbClr val="000000"/>
+                </a:solidFill>
+                <a:latin typeface="Arial"/>
+                <a:ea typeface="DejaVu Sans"/>
+              </a:rPr>
+              <a:t>dataset</a:t>
+            </a:r>
+            <a:r>
+              <a:rPr lang="pt-PT" sz="2200" b="0" strike="noStrike" spc="-1" dirty="0">
+                <a:solidFill>
+                  <a:srgbClr val="000000"/>
+                </a:solidFill>
+                <a:latin typeface="Arial"/>
+                <a:ea typeface="DejaVu Sans"/>
+              </a:rPr>
+              <a:t> devem ser colocados num diretório “</a:t>
+            </a:r>
+            <a:r>
+              <a:rPr lang="pt-PT" sz="2200" b="0" strike="noStrike" spc="-1" dirty="0" err="1">
+                <a:solidFill>
+                  <a:srgbClr val="000000"/>
+                </a:solidFill>
+                <a:latin typeface="Arial"/>
+                <a:ea typeface="DejaVu Sans"/>
+              </a:rPr>
+              <a:t>resources</a:t>
+            </a:r>
+            <a:r>
+              <a:rPr lang="pt-PT" sz="2200" b="0" strike="noStrike" spc="-1" dirty="0">
+                <a:solidFill>
+                  <a:srgbClr val="000000"/>
+                </a:solidFill>
+                <a:latin typeface="Arial"/>
+                <a:ea typeface="DejaVu Sans"/>
+              </a:rPr>
+              <a:t>”;</a:t>
+            </a:r>
+          </a:p>
           <a:p>
             <a:pPr marL="432000" indent="-321840">
               <a:lnSpc>

</xml_diff>